<commit_message>
Added definitions and notes to growth rate slide
</commit_message>
<xml_diff>
--- a/Group Project one  - updated.pptx
+++ b/Group Project one  - updated.pptx
@@ -211,7 +211,7 @@
           <a:p>
             <a:fld id="{EBEEC463-6649-4CA6-B1FF-E62EB0549193}" type="datetimeFigureOut">
               <a:rPr lang="en-US" smtClean="0"/>
-              <a:t>1/20/2019</a:t>
+              <a:t>1/21/2019</a:t>
             </a:fld>
             <a:endParaRPr lang="en-US"/>
           </a:p>
@@ -562,6 +562,98 @@
 </p:notes>
 </file>
 
+<file path=ppt/notesSlides/notesSlide2.xml><?xml version="1.0" encoding="utf-8"?>
+<p:notes xmlns:a="http://schemas.openxmlformats.org/drawingml/2006/main" xmlns:r="http://schemas.openxmlformats.org/officeDocument/2006/relationships" xmlns:p="http://schemas.openxmlformats.org/presentationml/2006/main">
+  <p:cSld>
+    <p:spTree>
+      <p:nvGrpSpPr>
+        <p:cNvPr id="1" name=""/>
+        <p:cNvGrpSpPr/>
+        <p:nvPr/>
+      </p:nvGrpSpPr>
+      <p:grpSpPr>
+        <a:xfrm>
+          <a:off x="0" y="0"/>
+          <a:ext cx="0" cy="0"/>
+          <a:chOff x="0" y="0"/>
+          <a:chExt cx="0" cy="0"/>
+        </a:xfrm>
+      </p:grpSpPr>
+      <p:sp>
+        <p:nvSpPr>
+          <p:cNvPr id="2" name="Slide Image Placeholder 1"/>
+          <p:cNvSpPr>
+            <a:spLocks noGrp="1" noRot="1" noChangeAspect="1"/>
+          </p:cNvSpPr>
+          <p:nvPr>
+            <p:ph type="sldImg"/>
+          </p:nvPr>
+        </p:nvSpPr>
+        <p:spPr/>
+      </p:sp>
+      <p:sp>
+        <p:nvSpPr>
+          <p:cNvPr id="3" name="Notes Placeholder 2"/>
+          <p:cNvSpPr>
+            <a:spLocks noGrp="1"/>
+          </p:cNvSpPr>
+          <p:nvPr>
+            <p:ph type="body" idx="1"/>
+          </p:nvPr>
+        </p:nvSpPr>
+        <p:spPr/>
+        <p:txBody>
+          <a:bodyPr/>
+          <a:lstStyle/>
+          <a:p>
+            <a:r>
+              <a:rPr lang="en-US" dirty="0"/>
+              <a:t>This data was obtained from UNC Chapel Hill and shows the growth rate of all counties in North Carolina as well as total population and numeric change ranking. This data shows that Mecklenburg county is growing at a far higher rate than most other counties and has the most people in general. The only county to outrank Mecklenburg in total population added is Wake County. Brunswick county is number 1 in growth rate but they are a small county of 10,000 meaning their addition of  2,000 people over ten years is makes their growth rate a bit misleading when compared to the 100,000 added to Wake and </a:t>
+            </a:r>
+            <a:r>
+              <a:rPr lang="en-US"/>
+              <a:t>Mecklenburg county.</a:t>
+            </a:r>
+            <a:endParaRPr lang="en-US" dirty="0"/>
+          </a:p>
+        </p:txBody>
+      </p:sp>
+      <p:sp>
+        <p:nvSpPr>
+          <p:cNvPr id="4" name="Slide Number Placeholder 3"/>
+          <p:cNvSpPr>
+            <a:spLocks noGrp="1"/>
+          </p:cNvSpPr>
+          <p:nvPr>
+            <p:ph type="sldNum" sz="quarter" idx="5"/>
+          </p:nvPr>
+        </p:nvSpPr>
+        <p:spPr/>
+        <p:txBody>
+          <a:bodyPr/>
+          <a:lstStyle/>
+          <a:p>
+            <a:fld id="{0D2EB464-7853-4793-A8FA-C6B1E498B353}" type="slidenum">
+              <a:rPr lang="en-US" smtClean="0"/>
+              <a:t>4</a:t>
+            </a:fld>
+            <a:endParaRPr lang="en-US"/>
+          </a:p>
+        </p:txBody>
+      </p:sp>
+    </p:spTree>
+    <p:extLst>
+      <p:ext uri="{BB962C8B-B14F-4D97-AF65-F5344CB8AC3E}">
+        <p14:creationId xmlns:p14="http://schemas.microsoft.com/office/powerpoint/2010/main" val="2018401975"/>
+      </p:ext>
+    </p:extLst>
+  </p:cSld>
+  <p:clrMapOvr>
+    <a:masterClrMapping/>
+  </p:clrMapOvr>
+</p:notes>
+</file>
+
 <file path=ppt/slideLayouts/slideLayout1.xml><?xml version="1.0" encoding="utf-8"?>
 <p:sldLayout xmlns:a="http://schemas.openxmlformats.org/drawingml/2006/main" xmlns:r="http://schemas.openxmlformats.org/officeDocument/2006/relationships" xmlns:p="http://schemas.openxmlformats.org/presentationml/2006/main" type="title" preserve="1">
   <p:cSld name="Title Slide">
@@ -732,7 +824,7 @@
           <a:p>
             <a:fld id="{087854FD-208A-4C44-851D-2D2BA798626A}" type="datetime1">
               <a:rPr lang="en-US" smtClean="0"/>
-              <a:t>1/20/2019</a:t>
+              <a:t>1/21/2019</a:t>
             </a:fld>
             <a:endParaRPr lang="en-US" dirty="0"/>
           </a:p>
@@ -998,7 +1090,7 @@
           <a:p>
             <a:fld id="{4398A69E-B9DF-4C22-AACE-ABC36BC18FDD}" type="datetime1">
               <a:rPr lang="en-US" smtClean="0"/>
-              <a:t>1/20/2019</a:t>
+              <a:t>1/21/2019</a:t>
             </a:fld>
             <a:endParaRPr lang="en-US" dirty="0"/>
           </a:p>
@@ -1228,7 +1320,7 @@
           <a:p>
             <a:fld id="{D8E07B1D-CDB3-4096-A796-CA43FE89B647}" type="datetime1">
               <a:rPr lang="en-US" smtClean="0"/>
-              <a:t>1/20/2019</a:t>
+              <a:t>1/21/2019</a:t>
             </a:fld>
             <a:endParaRPr lang="en-US" dirty="0"/>
           </a:p>
@@ -1537,7 +1629,7 @@
           <a:p>
             <a:fld id="{08C021AC-A13A-41E1-8AC6-9DA11D4E89AA}" type="datetime1">
               <a:rPr lang="en-US" smtClean="0"/>
-              <a:t>1/20/2019</a:t>
+              <a:t>1/21/2019</a:t>
             </a:fld>
             <a:endParaRPr lang="en-US" dirty="0"/>
           </a:p>
@@ -2009,7 +2101,7 @@
           <a:p>
             <a:fld id="{4A2B6BC8-4096-4CB1-B016-08F5DAF7765A}" type="datetime1">
               <a:rPr lang="en-US" smtClean="0"/>
-              <a:t>1/20/2019</a:t>
+              <a:t>1/21/2019</a:t>
             </a:fld>
             <a:endParaRPr lang="en-US" dirty="0"/>
           </a:p>
@@ -2555,7 +2647,7 @@
           <a:p>
             <a:fld id="{C08391A9-AAE5-45A0-A6B4-60846F445944}" type="datetime1">
               <a:rPr lang="en-US" smtClean="0"/>
-              <a:t>1/20/2019</a:t>
+              <a:t>1/21/2019</a:t>
             </a:fld>
             <a:endParaRPr lang="en-US" dirty="0"/>
           </a:p>
@@ -3328,7 +3420,7 @@
           <a:p>
             <a:fld id="{CC477687-664A-45D4-AF3F-263825A62E5F}" type="datetime1">
               <a:rPr lang="en-US" smtClean="0"/>
-              <a:t>1/20/2019</a:t>
+              <a:t>1/21/2019</a:t>
             </a:fld>
             <a:endParaRPr lang="en-US" dirty="0"/>
           </a:p>
@@ -3502,7 +3594,7 @@
           <a:p>
             <a:fld id="{3BB01675-064D-44FD-B536-85EECDD767E4}" type="datetime1">
               <a:rPr lang="en-US" smtClean="0"/>
-              <a:t>1/20/2019</a:t>
+              <a:t>1/21/2019</a:t>
             </a:fld>
             <a:endParaRPr lang="en-US" dirty="0"/>
           </a:p>
@@ -3724,7 +3816,7 @@
           <a:p>
             <a:fld id="{44D3BC9E-B9EB-4F16-B11F-E8E614F3A490}" type="datetime1">
               <a:rPr lang="en-US" smtClean="0"/>
-              <a:t>1/20/2019</a:t>
+              <a:t>1/21/2019</a:t>
             </a:fld>
             <a:endParaRPr lang="en-US" dirty="0"/>
           </a:p>
@@ -3903,7 +3995,7 @@
           <a:p>
             <a:fld id="{F8EDA6F4-FE8E-4C9E-9945-E8E875CE6068}" type="datetime1">
               <a:rPr lang="en-US" smtClean="0"/>
-              <a:t>1/20/2019</a:t>
+              <a:t>1/21/2019</a:t>
             </a:fld>
             <a:endParaRPr lang="en-US" dirty="0"/>
           </a:p>
@@ -4191,7 +4283,7 @@
           <a:p>
             <a:fld id="{7DBBCC6B-3ED7-4010-B7C8-243423A442DF}" type="datetime1">
               <a:rPr lang="en-US" smtClean="0"/>
-              <a:t>1/20/2019</a:t>
+              <a:t>1/21/2019</a:t>
             </a:fld>
             <a:endParaRPr lang="en-US" dirty="0"/>
           </a:p>
@@ -4432,7 +4524,7 @@
           <a:p>
             <a:fld id="{D1FE269D-2DC6-4A32-A537-F74EE5215011}" type="datetime1">
               <a:rPr lang="en-US" smtClean="0"/>
-              <a:t>1/20/2019</a:t>
+              <a:t>1/21/2019</a:t>
             </a:fld>
             <a:endParaRPr lang="en-US" dirty="0"/>
           </a:p>
@@ -4810,7 +4902,7 @@
           <a:p>
             <a:fld id="{A74D7546-BCBA-46A7-8065-8E94F65EF83F}" type="datetime1">
               <a:rPr lang="en-US" smtClean="0"/>
-              <a:t>1/20/2019</a:t>
+              <a:t>1/21/2019</a:t>
             </a:fld>
             <a:endParaRPr lang="en-US" dirty="0"/>
           </a:p>
@@ -4927,7 +5019,7 @@
           <a:p>
             <a:fld id="{5687AA2A-926F-4BE5-94D8-C5678B13AF79}" type="datetime1">
               <a:rPr lang="en-US" smtClean="0"/>
-              <a:t>1/20/2019</a:t>
+              <a:t>1/21/2019</a:t>
             </a:fld>
             <a:endParaRPr lang="en-US" dirty="0"/>
           </a:p>
@@ -5021,7 +5113,7 @@
           <a:p>
             <a:fld id="{84834B64-7529-4855-B067-19556CD4451A}" type="datetime1">
               <a:rPr lang="en-US" smtClean="0"/>
-              <a:t>1/20/2019</a:t>
+              <a:t>1/21/2019</a:t>
             </a:fld>
             <a:endParaRPr lang="en-US" dirty="0"/>
           </a:p>
@@ -5269,7 +5361,7 @@
           <a:p>
             <a:fld id="{4C737946-B8A3-4F29-A63D-ED059114489A}" type="datetime1">
               <a:rPr lang="en-US" smtClean="0"/>
-              <a:t>1/20/2019</a:t>
+              <a:t>1/21/2019</a:t>
             </a:fld>
             <a:endParaRPr lang="en-US" dirty="0"/>
           </a:p>
@@ -5525,7 +5617,7 @@
           <a:p>
             <a:fld id="{6D7361A8-5E42-4E5E-872A-AF69B61596F9}" type="datetime1">
               <a:rPr lang="en-US" smtClean="0"/>
-              <a:t>1/20/2019</a:t>
+              <a:t>1/21/2019</a:t>
             </a:fld>
             <a:endParaRPr lang="en-US" dirty="0"/>
           </a:p>
@@ -5767,7 +5859,7 @@
           <a:p>
             <a:fld id="{C8DA0BBE-6CDC-47A8-90AB-BA8366541172}" type="datetime1">
               <a:rPr lang="en-US" smtClean="0"/>
-              <a:t>1/20/2019</a:t>
+              <a:t>1/21/2019</a:t>
             </a:fld>
             <a:endParaRPr lang="en-US" dirty="0"/>
           </a:p>
@@ -7031,12 +7123,8 @@
           <a:lstStyle/>
           <a:p>
             <a:r>
-              <a:rPr lang="en-US" dirty="0" err="1"/>
-              <a:t>Defintions</a:t>
-            </a:r>
-            <a:r>
               <a:rPr lang="en-US" dirty="0"/>
-              <a:t>:</a:t>
+              <a:t>Definitions:</a:t>
             </a:r>
           </a:p>
         </p:txBody>
@@ -7064,25 +7152,25 @@
           <a:p>
             <a:r>
               <a:rPr lang="en-US" dirty="0"/>
-              <a:t>Homelessness</a:t>
+              <a:t>Homelessness: An individual who lacks housing including those in transitional quarters, public or private shelters, and temporary housing.</a:t>
             </a:r>
           </a:p>
           <a:p>
             <a:r>
               <a:rPr lang="en-US" dirty="0"/>
-              <a:t>Poverty </a:t>
+              <a:t>Poverty: Amount of families living below the US Census calculated poverty threshold. Poverty threshold is calculated salary total specific households much reach to not be considered in poverty. </a:t>
             </a:r>
           </a:p>
           <a:p>
             <a:r>
               <a:rPr lang="en-US" dirty="0"/>
-              <a:t>Cost of Living index</a:t>
-            </a:r>
-          </a:p>
-          <a:p>
-            <a:endParaRPr lang="en-US" dirty="0"/>
-          </a:p>
-          <a:p>
+              <a:t>Cost of Living index: A indicator that measures the change in the cost of a fixed basket of products and services—e.g. housing, food, utilities. Cities are compared to a national average and salary differences by area  taken into account.</a:t>
+            </a:r>
+          </a:p>
+          <a:p>
+            <a:pPr marL="0" indent="0">
+              <a:buNone/>
+            </a:pPr>
             <a:endParaRPr lang="en-US" dirty="0"/>
           </a:p>
         </p:txBody>
@@ -7162,7 +7250,7 @@
           </p:nvPr>
         </p:nvPicPr>
         <p:blipFill>
-          <a:blip r:embed="rId2"/>
+          <a:blip r:embed="rId3"/>
           <a:stretch>
             <a:fillRect/>
           </a:stretch>

</xml_diff>

<commit_message>
removed original home sale prices notebook
</commit_message>
<xml_diff>
--- a/Group Project one  - updated.pptx
+++ b/Group Project one  - updated.pptx
@@ -211,7 +211,7 @@
           <a:p>
             <a:fld id="{EBEEC463-6649-4CA6-B1FF-E62EB0549193}" type="datetimeFigureOut">
               <a:rPr lang="en-US" smtClean="0"/>
-              <a:t>1/21/2019</a:t>
+              <a:t>1/22/2019</a:t>
             </a:fld>
             <a:endParaRPr lang="en-US"/>
           </a:p>
@@ -824,7 +824,7 @@
           <a:p>
             <a:fld id="{087854FD-208A-4C44-851D-2D2BA798626A}" type="datetime1">
               <a:rPr lang="en-US" smtClean="0"/>
-              <a:t>1/21/2019</a:t>
+              <a:t>1/22/2019</a:t>
             </a:fld>
             <a:endParaRPr lang="en-US" dirty="0"/>
           </a:p>
@@ -1090,7 +1090,7 @@
           <a:p>
             <a:fld id="{4398A69E-B9DF-4C22-AACE-ABC36BC18FDD}" type="datetime1">
               <a:rPr lang="en-US" smtClean="0"/>
-              <a:t>1/21/2019</a:t>
+              <a:t>1/22/2019</a:t>
             </a:fld>
             <a:endParaRPr lang="en-US" dirty="0"/>
           </a:p>
@@ -1320,7 +1320,7 @@
           <a:p>
             <a:fld id="{D8E07B1D-CDB3-4096-A796-CA43FE89B647}" type="datetime1">
               <a:rPr lang="en-US" smtClean="0"/>
-              <a:t>1/21/2019</a:t>
+              <a:t>1/22/2019</a:t>
             </a:fld>
             <a:endParaRPr lang="en-US" dirty="0"/>
           </a:p>
@@ -1629,7 +1629,7 @@
           <a:p>
             <a:fld id="{08C021AC-A13A-41E1-8AC6-9DA11D4E89AA}" type="datetime1">
               <a:rPr lang="en-US" smtClean="0"/>
-              <a:t>1/21/2019</a:t>
+              <a:t>1/22/2019</a:t>
             </a:fld>
             <a:endParaRPr lang="en-US" dirty="0"/>
           </a:p>
@@ -2101,7 +2101,7 @@
           <a:p>
             <a:fld id="{4A2B6BC8-4096-4CB1-B016-08F5DAF7765A}" type="datetime1">
               <a:rPr lang="en-US" smtClean="0"/>
-              <a:t>1/21/2019</a:t>
+              <a:t>1/22/2019</a:t>
             </a:fld>
             <a:endParaRPr lang="en-US" dirty="0"/>
           </a:p>
@@ -2647,7 +2647,7 @@
           <a:p>
             <a:fld id="{C08391A9-AAE5-45A0-A6B4-60846F445944}" type="datetime1">
               <a:rPr lang="en-US" smtClean="0"/>
-              <a:t>1/21/2019</a:t>
+              <a:t>1/22/2019</a:t>
             </a:fld>
             <a:endParaRPr lang="en-US" dirty="0"/>
           </a:p>
@@ -3420,7 +3420,7 @@
           <a:p>
             <a:fld id="{CC477687-664A-45D4-AF3F-263825A62E5F}" type="datetime1">
               <a:rPr lang="en-US" smtClean="0"/>
-              <a:t>1/21/2019</a:t>
+              <a:t>1/22/2019</a:t>
             </a:fld>
             <a:endParaRPr lang="en-US" dirty="0"/>
           </a:p>
@@ -3594,7 +3594,7 @@
           <a:p>
             <a:fld id="{3BB01675-064D-44FD-B536-85EECDD767E4}" type="datetime1">
               <a:rPr lang="en-US" smtClean="0"/>
-              <a:t>1/21/2019</a:t>
+              <a:t>1/22/2019</a:t>
             </a:fld>
             <a:endParaRPr lang="en-US" dirty="0"/>
           </a:p>
@@ -3816,7 +3816,7 @@
           <a:p>
             <a:fld id="{44D3BC9E-B9EB-4F16-B11F-E8E614F3A490}" type="datetime1">
               <a:rPr lang="en-US" smtClean="0"/>
-              <a:t>1/21/2019</a:t>
+              <a:t>1/22/2019</a:t>
             </a:fld>
             <a:endParaRPr lang="en-US" dirty="0"/>
           </a:p>
@@ -3995,7 +3995,7 @@
           <a:p>
             <a:fld id="{F8EDA6F4-FE8E-4C9E-9945-E8E875CE6068}" type="datetime1">
               <a:rPr lang="en-US" smtClean="0"/>
-              <a:t>1/21/2019</a:t>
+              <a:t>1/22/2019</a:t>
             </a:fld>
             <a:endParaRPr lang="en-US" dirty="0"/>
           </a:p>
@@ -4283,7 +4283,7 @@
           <a:p>
             <a:fld id="{7DBBCC6B-3ED7-4010-B7C8-243423A442DF}" type="datetime1">
               <a:rPr lang="en-US" smtClean="0"/>
-              <a:t>1/21/2019</a:t>
+              <a:t>1/22/2019</a:t>
             </a:fld>
             <a:endParaRPr lang="en-US" dirty="0"/>
           </a:p>
@@ -4524,7 +4524,7 @@
           <a:p>
             <a:fld id="{D1FE269D-2DC6-4A32-A537-F74EE5215011}" type="datetime1">
               <a:rPr lang="en-US" smtClean="0"/>
-              <a:t>1/21/2019</a:t>
+              <a:t>1/22/2019</a:t>
             </a:fld>
             <a:endParaRPr lang="en-US" dirty="0"/>
           </a:p>
@@ -4902,7 +4902,7 @@
           <a:p>
             <a:fld id="{A74D7546-BCBA-46A7-8065-8E94F65EF83F}" type="datetime1">
               <a:rPr lang="en-US" smtClean="0"/>
-              <a:t>1/21/2019</a:t>
+              <a:t>1/22/2019</a:t>
             </a:fld>
             <a:endParaRPr lang="en-US" dirty="0"/>
           </a:p>
@@ -5019,7 +5019,7 @@
           <a:p>
             <a:fld id="{5687AA2A-926F-4BE5-94D8-C5678B13AF79}" type="datetime1">
               <a:rPr lang="en-US" smtClean="0"/>
-              <a:t>1/21/2019</a:t>
+              <a:t>1/22/2019</a:t>
             </a:fld>
             <a:endParaRPr lang="en-US" dirty="0"/>
           </a:p>
@@ -5113,7 +5113,7 @@
           <a:p>
             <a:fld id="{84834B64-7529-4855-B067-19556CD4451A}" type="datetime1">
               <a:rPr lang="en-US" smtClean="0"/>
-              <a:t>1/21/2019</a:t>
+              <a:t>1/22/2019</a:t>
             </a:fld>
             <a:endParaRPr lang="en-US" dirty="0"/>
           </a:p>
@@ -5361,7 +5361,7 @@
           <a:p>
             <a:fld id="{4C737946-B8A3-4F29-A63D-ED059114489A}" type="datetime1">
               <a:rPr lang="en-US" smtClean="0"/>
-              <a:t>1/21/2019</a:t>
+              <a:t>1/22/2019</a:t>
             </a:fld>
             <a:endParaRPr lang="en-US" dirty="0"/>
           </a:p>
@@ -5617,7 +5617,7 @@
           <a:p>
             <a:fld id="{6D7361A8-5E42-4E5E-872A-AF69B61596F9}" type="datetime1">
               <a:rPr lang="en-US" smtClean="0"/>
-              <a:t>1/21/2019</a:t>
+              <a:t>1/22/2019</a:t>
             </a:fld>
             <a:endParaRPr lang="en-US" dirty="0"/>
           </a:p>
@@ -5859,7 +5859,7 @@
           <a:p>
             <a:fld id="{C8DA0BBE-6CDC-47A8-90AB-BA8366541172}" type="datetime1">
               <a:rPr lang="en-US" smtClean="0"/>
-              <a:t>1/21/2019</a:t>
+              <a:t>1/22/2019</a:t>
             </a:fld>
             <a:endParaRPr lang="en-US" dirty="0"/>
           </a:p>
@@ -7208,7 +7208,15 @@
           <a:p>
             <a:r>
               <a:rPr lang="en-US" dirty="0"/>
-              <a:t>Cost of Living index: A indicator that measures the change in the cost of a fixed basket of products and services—e.g. housing, food, utilities. Cities are compared to a national average and salary differences by area  taken into account.</a:t>
+              <a:t>Cost of Living index</a:t>
+            </a:r>
+            <a:r>
+              <a:rPr lang="en-US"/>
+              <a:t>: An </a:t>
+            </a:r>
+            <a:r>
+              <a:rPr lang="en-US" dirty="0"/>
+              <a:t>indicator that measures the change in the cost of a fixed basket of products and services—e.g. housing, food, utilities. Cities are compared to a national average and salary differences by area  taken into account.</a:t>
             </a:r>
           </a:p>
           <a:p>

</xml_diff>